<commit_message>
Revert "Merge branch 'main' of https://github.com/Marquez-David/TECNOLOGIAS-SOCIEDAD-DIGITAL into main"
This reverts commit 8dcbec414d7d7bbfde7e6e33bb5de8969cef0981, reversing
changes made to d35f204092cf754ac9bc6dcb83ad507c92229bb0.
</commit_message>
<xml_diff>
--- a/TF-E6/Presentacion/PresentaciónTFv4.pptx
+++ b/TF-E6/Presentacion/PresentaciónTFv4.pptx
@@ -2503,7 +2503,7 @@
           <a:p>
             <a:fld id="{BD74F7B1-EB25-4A1D-B0FD-5D7E30F0F156}" type="datetimeFigureOut">
               <a:rPr lang="es-ES" smtClean="0"/>
-              <a:t>21/01/2021</a:t>
+              <a:t>20/01/2021</a:t>
             </a:fld>
             <a:endParaRPr lang="es-ES"/>
           </a:p>
@@ -2701,7 +2701,7 @@
           <a:p>
             <a:fld id="{BD74F7B1-EB25-4A1D-B0FD-5D7E30F0F156}" type="datetimeFigureOut">
               <a:rPr lang="es-ES" smtClean="0"/>
-              <a:t>21/01/2021</a:t>
+              <a:t>20/01/2021</a:t>
             </a:fld>
             <a:endParaRPr lang="es-ES"/>
           </a:p>
@@ -2909,7 +2909,7 @@
           <a:p>
             <a:fld id="{BD74F7B1-EB25-4A1D-B0FD-5D7E30F0F156}" type="datetimeFigureOut">
               <a:rPr lang="es-ES" smtClean="0"/>
-              <a:t>21/01/2021</a:t>
+              <a:t>20/01/2021</a:t>
             </a:fld>
             <a:endParaRPr lang="es-ES"/>
           </a:p>
@@ -3107,7 +3107,7 @@
           <a:p>
             <a:fld id="{BD74F7B1-EB25-4A1D-B0FD-5D7E30F0F156}" type="datetimeFigureOut">
               <a:rPr lang="es-ES" smtClean="0"/>
-              <a:t>21/01/2021</a:t>
+              <a:t>20/01/2021</a:t>
             </a:fld>
             <a:endParaRPr lang="es-ES"/>
           </a:p>
@@ -3382,7 +3382,7 @@
           <a:p>
             <a:fld id="{BD74F7B1-EB25-4A1D-B0FD-5D7E30F0F156}" type="datetimeFigureOut">
               <a:rPr lang="es-ES" smtClean="0"/>
-              <a:t>21/01/2021</a:t>
+              <a:t>20/01/2021</a:t>
             </a:fld>
             <a:endParaRPr lang="es-ES"/>
           </a:p>
@@ -3647,7 +3647,7 @@
           <a:p>
             <a:fld id="{BD74F7B1-EB25-4A1D-B0FD-5D7E30F0F156}" type="datetimeFigureOut">
               <a:rPr lang="es-ES" smtClean="0"/>
-              <a:t>21/01/2021</a:t>
+              <a:t>20/01/2021</a:t>
             </a:fld>
             <a:endParaRPr lang="es-ES"/>
           </a:p>
@@ -4059,7 +4059,7 @@
           <a:p>
             <a:fld id="{BD74F7B1-EB25-4A1D-B0FD-5D7E30F0F156}" type="datetimeFigureOut">
               <a:rPr lang="es-ES" smtClean="0"/>
-              <a:t>21/01/2021</a:t>
+              <a:t>20/01/2021</a:t>
             </a:fld>
             <a:endParaRPr lang="es-ES"/>
           </a:p>
@@ -4200,7 +4200,7 @@
           <a:p>
             <a:fld id="{BD74F7B1-EB25-4A1D-B0FD-5D7E30F0F156}" type="datetimeFigureOut">
               <a:rPr lang="es-ES" smtClean="0"/>
-              <a:t>21/01/2021</a:t>
+              <a:t>20/01/2021</a:t>
             </a:fld>
             <a:endParaRPr lang="es-ES"/>
           </a:p>
@@ -4313,7 +4313,7 @@
           <a:p>
             <a:fld id="{BD74F7B1-EB25-4A1D-B0FD-5D7E30F0F156}" type="datetimeFigureOut">
               <a:rPr lang="es-ES" smtClean="0"/>
-              <a:t>21/01/2021</a:t>
+              <a:t>20/01/2021</a:t>
             </a:fld>
             <a:endParaRPr lang="es-ES"/>
           </a:p>
@@ -4624,7 +4624,7 @@
           <a:p>
             <a:fld id="{BD74F7B1-EB25-4A1D-B0FD-5D7E30F0F156}" type="datetimeFigureOut">
               <a:rPr lang="es-ES" smtClean="0"/>
-              <a:t>21/01/2021</a:t>
+              <a:t>20/01/2021</a:t>
             </a:fld>
             <a:endParaRPr lang="es-ES"/>
           </a:p>
@@ -4912,7 +4912,7 @@
           <a:p>
             <a:fld id="{BD74F7B1-EB25-4A1D-B0FD-5D7E30F0F156}" type="datetimeFigureOut">
               <a:rPr lang="es-ES" smtClean="0"/>
-              <a:t>21/01/2021</a:t>
+              <a:t>20/01/2021</a:t>
             </a:fld>
             <a:endParaRPr lang="es-ES"/>
           </a:p>
@@ -5153,7 +5153,7 @@
           <a:p>
             <a:fld id="{BD74F7B1-EB25-4A1D-B0FD-5D7E30F0F156}" type="datetimeFigureOut">
               <a:rPr lang="es-ES" smtClean="0"/>
-              <a:t>21/01/2021</a:t>
+              <a:t>20/01/2021</a:t>
             </a:fld>
             <a:endParaRPr lang="es-ES"/>
           </a:p>
@@ -6310,42 +6310,6 @@
           </a:p>
         </p:txBody>
       </p:sp>
-      <p:pic>
-        <p:nvPicPr>
-          <p:cNvPr id="10" name="Imagen 9" descr="Imagen que contiene herramienta&#10;&#10;Descripción generada automáticamente">
-            <a:extLst>
-              <a:ext uri="{FF2B5EF4-FFF2-40B4-BE49-F238E27FC236}">
-                <a16:creationId xmlns:a16="http://schemas.microsoft.com/office/drawing/2014/main" id="{B88DF093-F2AE-4435-9687-7478B7F037C1}"/>
-              </a:ext>
-            </a:extLst>
-          </p:cNvPr>
-          <p:cNvPicPr>
-            <a:picLocks noChangeAspect="1"/>
-          </p:cNvPicPr>
-          <p:nvPr/>
-        </p:nvPicPr>
-        <p:blipFill>
-          <a:blip r:embed="rId3">
-            <a:extLst>
-              <a:ext uri="{28A0092B-C50C-407E-A947-70E740481C1C}">
-                <a14:useLocalDpi xmlns:a14="http://schemas.microsoft.com/office/drawing/2010/main" val="0"/>
-              </a:ext>
-            </a:extLst>
-          </a:blip>
-          <a:stretch>
-            <a:fillRect/>
-          </a:stretch>
-        </p:blipFill>
-        <p:spPr>
-          <a:xfrm>
-            <a:off x="8471424" y="1334193"/>
-            <a:ext cx="3333750" cy="2752725"/>
-          </a:xfrm>
-          <a:prstGeom prst="rect">
-            <a:avLst/>
-          </a:prstGeom>
-        </p:spPr>
-      </p:pic>
     </p:spTree>
     <p:extLst>
       <p:ext uri="{BB962C8B-B14F-4D97-AF65-F5344CB8AC3E}">
@@ -6778,42 +6742,6 @@
           </a:p>
         </p:txBody>
       </p:sp>
-      <p:pic>
-        <p:nvPicPr>
-          <p:cNvPr id="9" name="Imagen 8" descr="Imagen que contiene herramienta&#10;&#10;Descripción generada automáticamente">
-            <a:extLst>
-              <a:ext uri="{FF2B5EF4-FFF2-40B4-BE49-F238E27FC236}">
-                <a16:creationId xmlns:a16="http://schemas.microsoft.com/office/drawing/2014/main" id="{3EAC95F2-0593-4562-82E3-CDBBF7EB88BB}"/>
-              </a:ext>
-            </a:extLst>
-          </p:cNvPr>
-          <p:cNvPicPr>
-            <a:picLocks noChangeAspect="1"/>
-          </p:cNvPicPr>
-          <p:nvPr/>
-        </p:nvPicPr>
-        <p:blipFill>
-          <a:blip r:embed="rId2">
-            <a:extLst>
-              <a:ext uri="{28A0092B-C50C-407E-A947-70E740481C1C}">
-                <a14:useLocalDpi xmlns:a14="http://schemas.microsoft.com/office/drawing/2010/main" val="0"/>
-              </a:ext>
-            </a:extLst>
-          </a:blip>
-          <a:stretch>
-            <a:fillRect/>
-          </a:stretch>
-        </p:blipFill>
-        <p:spPr>
-          <a:xfrm>
-            <a:off x="8112233" y="1431577"/>
-            <a:ext cx="3333750" cy="2752725"/>
-          </a:xfrm>
-          <a:prstGeom prst="rect">
-            <a:avLst/>
-          </a:prstGeom>
-        </p:spPr>
-      </p:pic>
     </p:spTree>
     <p:extLst>
       <p:ext uri="{BB962C8B-B14F-4D97-AF65-F5344CB8AC3E}">
@@ -21676,8 +21604,8 @@
         </p:nvSpPr>
         <p:spPr>
           <a:xfrm>
-            <a:off x="1559465" y="2397428"/>
-            <a:ext cx="8227267" cy="1631216"/>
+            <a:off x="2065493" y="1900905"/>
+            <a:ext cx="8227267" cy="3477875"/>
           </a:xfrm>
           <a:prstGeom prst="rect">
             <a:avLst/>
@@ -21689,20 +21617,22 @@
           </a:bodyPr>
           <a:lstStyle/>
           <a:p>
-            <a:r>
-              <a:rPr lang="es-ES" sz="2000" u="sng" dirty="0"/>
-              <a:t>Niveles de gravedad de las vulnerabilidades:</a:t>
-            </a:r>
-          </a:p>
-          <a:p>
             <a:pPr marL="342900" indent="-342900">
               <a:buFont typeface="Arial" panose="020B0604020202020204" pitchFamily="34" charset="0"/>
               <a:buChar char="•"/>
             </a:pPr>
             <a:r>
+              <a:rPr lang="es-ES" sz="2000" u="sng" dirty="0"/>
+              <a:t>Gravedad baja:</a:t>
+            </a:r>
+            <a:r>
               <a:rPr lang="es-ES" sz="2000" dirty="0"/>
-              <a:t>Gravedad baja</a:t>
-            </a:r>
+              <a:t> Tienen un impacto mínimo y son fáciles de eliminar.</a:t>
+            </a:r>
+          </a:p>
+          <a:p>
+            <a:pPr lvl="1"/>
+            <a:endParaRPr lang="es-ES" sz="2000" dirty="0"/>
           </a:p>
           <a:p>
             <a:pPr marL="342900" indent="-342900">
@@ -21710,9 +21640,16 @@
               <a:buChar char="•"/>
             </a:pPr>
             <a:r>
+              <a:rPr lang="es-ES" sz="2000" u="sng" dirty="0"/>
+              <a:t>Gravedad media:</a:t>
+            </a:r>
+            <a:r>
               <a:rPr lang="es-ES" sz="2000" dirty="0"/>
-              <a:t>Gravedad media</a:t>
-            </a:r>
+              <a:t> Son fáciles de eliminar, pero el no hacerlo tiene un impacto notable sobre el sistema.</a:t>
+            </a:r>
+          </a:p>
+          <a:p>
+            <a:endParaRPr lang="es-ES" sz="2000" dirty="0"/>
           </a:p>
           <a:p>
             <a:pPr marL="342900" indent="-342900">
@@ -21720,9 +21657,17 @@
               <a:buChar char="•"/>
             </a:pPr>
             <a:r>
+              <a:rPr lang="es-ES" sz="2000" u="sng" dirty="0"/>
+              <a:t>Gravedad alta:</a:t>
+            </a:r>
+            <a:r>
               <a:rPr lang="es-ES" sz="2000" dirty="0"/>
-              <a:t>Gravedad alta</a:t>
-            </a:r>
+              <a:t> Al ser explotadas causan un daño rápido y de gran impacto sobre el sistema, que además no tiene una fácil solución.</a:t>
+            </a:r>
+          </a:p>
+          <a:p>
+            <a:pPr lvl="1"/>
+            <a:endParaRPr lang="es-ES" sz="2000" dirty="0"/>
           </a:p>
           <a:p>
             <a:pPr marL="342900" indent="-342900">
@@ -21730,48 +21675,16 @@
               <a:buChar char="•"/>
             </a:pPr>
             <a:r>
+              <a:rPr lang="es-ES" sz="2000" u="sng" dirty="0"/>
+              <a:t>Gravedad crítica:</a:t>
+            </a:r>
+            <a:r>
               <a:rPr lang="es-ES" sz="2000" dirty="0"/>
-              <a:t>Gravedad crítica</a:t>
-            </a:r>
-          </a:p>
-        </p:txBody>
-      </p:sp>
-      <p:pic>
-        <p:nvPicPr>
-          <p:cNvPr id="9" name="Imagen 8" descr="Imagen que contiene dibujo&#10;&#10;Descripción generada automáticamente">
-            <a:extLst>
-              <a:ext uri="{FF2B5EF4-FFF2-40B4-BE49-F238E27FC236}">
-                <a16:creationId xmlns:a16="http://schemas.microsoft.com/office/drawing/2014/main" id="{8C3ADE7D-778F-4AF7-AA04-F2838EA9321B}"/>
-              </a:ext>
-            </a:extLst>
-          </p:cNvPr>
-          <p:cNvPicPr>
-            <a:picLocks noChangeAspect="1"/>
-          </p:cNvPicPr>
-          <p:nvPr/>
-        </p:nvPicPr>
-        <p:blipFill>
-          <a:blip r:embed="rId2">
-            <a:extLst>
-              <a:ext uri="{28A0092B-C50C-407E-A947-70E740481C1C}">
-                <a14:useLocalDpi xmlns:a14="http://schemas.microsoft.com/office/drawing/2010/main" val="0"/>
-              </a:ext>
-            </a:extLst>
-          </a:blip>
-          <a:stretch>
-            <a:fillRect/>
-          </a:stretch>
-        </p:blipFill>
-        <p:spPr>
-          <a:xfrm>
-            <a:off x="6726619" y="1811045"/>
-            <a:ext cx="5008430" cy="3511118"/>
-          </a:xfrm>
-          <a:prstGeom prst="rect">
-            <a:avLst/>
-          </a:prstGeom>
-        </p:spPr>
-      </p:pic>
+              <a:t> La explotación de esta conlleva problemas no solo para el equipo a través del cual se explota, sino que se expande por la red al que esta conectado el mismo.</a:t>
+            </a:r>
+          </a:p>
+        </p:txBody>
+      </p:sp>
     </p:spTree>
     <p:extLst>
       <p:ext uri="{BB962C8B-B14F-4D97-AF65-F5344CB8AC3E}">
@@ -22694,7 +22607,7 @@
         </p:blipFill>
         <p:spPr bwMode="auto">
           <a:xfrm>
-            <a:off x="7315200" y="1331651"/>
+            <a:off x="7315200" y="1305017"/>
             <a:ext cx="4682971" cy="4682971"/>
           </a:xfrm>
           <a:prstGeom prst="rect">
@@ -23046,8 +22959,8 @@
         </p:nvSpPr>
         <p:spPr>
           <a:xfrm>
-            <a:off x="1322773" y="1578773"/>
-            <a:ext cx="5868139" cy="4708981"/>
+            <a:off x="1864311" y="1732661"/>
+            <a:ext cx="7226423" cy="4401205"/>
           </a:xfrm>
           <a:prstGeom prst="rect">
             <a:avLst/>
@@ -23145,42 +23058,6 @@
           </a:p>
         </p:txBody>
       </p:sp>
-      <p:pic>
-        <p:nvPicPr>
-          <p:cNvPr id="13" name="Imagen 12">
-            <a:extLst>
-              <a:ext uri="{FF2B5EF4-FFF2-40B4-BE49-F238E27FC236}">
-                <a16:creationId xmlns:a16="http://schemas.microsoft.com/office/drawing/2014/main" id="{D746FB18-4430-4B3B-BDB8-526C119EDB47}"/>
-              </a:ext>
-            </a:extLst>
-          </p:cNvPr>
-          <p:cNvPicPr>
-            <a:picLocks noChangeAspect="1"/>
-          </p:cNvPicPr>
-          <p:nvPr/>
-        </p:nvPicPr>
-        <p:blipFill>
-          <a:blip r:embed="rId2">
-            <a:extLst>
-              <a:ext uri="{28A0092B-C50C-407E-A947-70E740481C1C}">
-                <a14:useLocalDpi xmlns:a14="http://schemas.microsoft.com/office/drawing/2010/main" val="0"/>
-              </a:ext>
-            </a:extLst>
-          </a:blip>
-          <a:stretch>
-            <a:fillRect/>
-          </a:stretch>
-        </p:blipFill>
-        <p:spPr>
-          <a:xfrm>
-            <a:off x="7501536" y="1358284"/>
-            <a:ext cx="4397680" cy="4336742"/>
-          </a:xfrm>
-          <a:prstGeom prst="rect">
-            <a:avLst/>
-          </a:prstGeom>
-        </p:spPr>
-      </p:pic>
     </p:spTree>
     <p:extLst>
       <p:ext uri="{BB962C8B-B14F-4D97-AF65-F5344CB8AC3E}">

</xml_diff>